<commit_message>
Setup pairing and mobbing
</commit_message>
<xml_diff>
--- a/Slides/How To Setup Remote Pairing & Mobibing.pptx
+++ b/Slides/How To Setup Remote Pairing & Mobibing.pptx
@@ -5,7 +5,7 @@
     <p:sldMasterId id="2147483658" r:id="rId1"/>
   </p:sldMasterIdLst>
   <p:notesMasterIdLst>
-    <p:notesMasterId r:id="rId29"/>
+    <p:notesMasterId r:id="rId30"/>
   </p:notesMasterIdLst>
   <p:sldIdLst>
     <p:sldId id="256" r:id="rId2"/>
@@ -34,21 +34,22 @@
     <p:sldId id="310" r:id="rId25"/>
     <p:sldId id="269" r:id="rId26"/>
     <p:sldId id="273" r:id="rId27"/>
-    <p:sldId id="278" r:id="rId28"/>
+    <p:sldId id="311" r:id="rId28"/>
+    <p:sldId id="278" r:id="rId29"/>
   </p:sldIdLst>
   <p:sldSz cx="9144000" cy="5143500" type="screen16x9"/>
   <p:notesSz cx="6858000" cy="9144000"/>
   <p:embeddedFontLst>
     <p:embeddedFont>
       <p:font typeface="Lora" pitchFamily="2" charset="77"/>
-      <p:regular r:id="rId30"/>
-      <p:bold r:id="rId31"/>
-      <p:italic r:id="rId32"/>
-      <p:boldItalic r:id="rId33"/>
+      <p:regular r:id="rId31"/>
+      <p:bold r:id="rId32"/>
+      <p:italic r:id="rId33"/>
+      <p:boldItalic r:id="rId34"/>
     </p:embeddedFont>
     <p:embeddedFont>
       <p:font typeface="Vidaloka" panose="02000504000000020004" pitchFamily="2" charset="0"/>
-      <p:regular r:id="rId34"/>
+      <p:regular r:id="rId35"/>
     </p:embeddedFont>
   </p:embeddedFontLst>
   <p:defaultTextStyle>
@@ -331,10 +332,14 @@
           <p14:sldIdLst>
             <p14:sldId id="269"/>
             <p14:sldId id="273"/>
+            <p14:sldId id="311"/>
             <p14:sldId id="278"/>
           </p14:sldIdLst>
         </p14:section>
       </p14:sectionLst>
+    </p:ext>
+    <p:ext uri="{EFAFB233-063F-42B5-8137-9DF3F51BA10A}">
+      <p15:sldGuideLst xmlns:p15="http://schemas.microsoft.com/office/powerpoint/2012/main"/>
     </p:ext>
   </p:extLst>
 </p:presentation>
@@ -48331,6 +48336,205 @@
   <p:cSld>
     <p:spTree>
       <p:nvGrpSpPr>
+        <p:cNvPr id="1" name=""/>
+        <p:cNvGrpSpPr/>
+        <p:nvPr/>
+      </p:nvGrpSpPr>
+      <p:grpSpPr>
+        <a:xfrm>
+          <a:off x="0" y="0"/>
+          <a:ext cx="0" cy="0"/>
+          <a:chOff x="0" y="0"/>
+          <a:chExt cx="0" cy="0"/>
+        </a:xfrm>
+      </p:grpSpPr>
+      <p:sp>
+        <p:nvSpPr>
+          <p:cNvPr id="6" name="Slide Number Placeholder 5">
+            <a:extLst>
+              <a:ext uri="{FF2B5EF4-FFF2-40B4-BE49-F238E27FC236}">
+                <a16:creationId xmlns:a16="http://schemas.microsoft.com/office/drawing/2014/main" id="{C3E712F1-2E8D-9A47-8DA9-323576FF73A1}"/>
+              </a:ext>
+            </a:extLst>
+          </p:cNvPr>
+          <p:cNvSpPr>
+            <a:spLocks noGrp="1"/>
+          </p:cNvSpPr>
+          <p:nvPr>
+            <p:ph type="sldNum" idx="12"/>
+          </p:nvPr>
+        </p:nvSpPr>
+        <p:spPr/>
+        <p:txBody>
+          <a:bodyPr/>
+          <a:lstStyle/>
+          <a:p>
+            <a:pPr marL="0" lvl="0" indent="0" algn="r" rtl="0">
+              <a:spcBef>
+                <a:spcPts val="0"/>
+              </a:spcBef>
+              <a:spcAft>
+                <a:spcPts val="0"/>
+              </a:spcAft>
+              <a:buNone/>
+            </a:pPr>
+            <a:fld id="{00000000-1234-1234-1234-123412341234}" type="slidenum">
+              <a:rPr lang="en" smtClean="0"/>
+              <a:t>27</a:t>
+            </a:fld>
+            <a:endParaRPr lang="en"/>
+          </a:p>
+        </p:txBody>
+      </p:sp>
+      <p:sp>
+        <p:nvSpPr>
+          <p:cNvPr id="2" name="Title 1">
+            <a:extLst>
+              <a:ext uri="{FF2B5EF4-FFF2-40B4-BE49-F238E27FC236}">
+                <a16:creationId xmlns:a16="http://schemas.microsoft.com/office/drawing/2014/main" id="{3DC9714C-CD74-0744-8090-9BD49599E921}"/>
+              </a:ext>
+            </a:extLst>
+          </p:cNvPr>
+          <p:cNvSpPr>
+            <a:spLocks noGrp="1"/>
+          </p:cNvSpPr>
+          <p:nvPr>
+            <p:ph type="title" idx="4294967295"/>
+          </p:nvPr>
+        </p:nvSpPr>
+        <p:spPr>
+          <a:xfrm>
+            <a:off x="289711" y="338672"/>
+            <a:ext cx="5462588" cy="395287"/>
+          </a:xfrm>
+        </p:spPr>
+        <p:txBody>
+          <a:bodyPr/>
+          <a:lstStyle/>
+          <a:p>
+            <a:r>
+              <a:rPr lang="en-US" dirty="0"/>
+              <a:t>References</a:t>
+            </a:r>
+          </a:p>
+        </p:txBody>
+      </p:sp>
+      <p:pic>
+        <p:nvPicPr>
+          <p:cNvPr id="8" name="Graphic 7">
+            <a:extLst>
+              <a:ext uri="{FF2B5EF4-FFF2-40B4-BE49-F238E27FC236}">
+                <a16:creationId xmlns:a16="http://schemas.microsoft.com/office/drawing/2014/main" id="{EE16892D-7CBE-A840-B4C4-BE176FF27638}"/>
+              </a:ext>
+            </a:extLst>
+          </p:cNvPr>
+          <p:cNvPicPr>
+            <a:picLocks noChangeAspect="1"/>
+          </p:cNvPicPr>
+          <p:nvPr/>
+        </p:nvPicPr>
+        <p:blipFill>
+          <a:blip r:embed="rId2">
+            <a:extLst>
+              <a:ext uri="{96DAC541-7B7A-43D3-8B79-37D633B846F1}">
+                <asvg:svgBlip xmlns:asvg="http://schemas.microsoft.com/office/drawing/2016/SVG/main" r:embed="rId3"/>
+              </a:ext>
+            </a:extLst>
+          </a:blip>
+          <a:stretch>
+            <a:fillRect/>
+          </a:stretch>
+        </p:blipFill>
+        <p:spPr>
+          <a:xfrm>
+            <a:off x="4000500" y="0"/>
+            <a:ext cx="5143500" cy="5143500"/>
+          </a:xfrm>
+          <a:prstGeom prst="rect">
+            <a:avLst/>
+          </a:prstGeom>
+        </p:spPr>
+      </p:pic>
+      <p:sp>
+        <p:nvSpPr>
+          <p:cNvPr id="10" name="Rectangle 9">
+            <a:extLst>
+              <a:ext uri="{FF2B5EF4-FFF2-40B4-BE49-F238E27FC236}">
+                <a16:creationId xmlns:a16="http://schemas.microsoft.com/office/drawing/2014/main" id="{FA854A6B-234E-C04D-812F-F821520F2E99}"/>
+              </a:ext>
+            </a:extLst>
+          </p:cNvPr>
+          <p:cNvSpPr/>
+          <p:nvPr/>
+        </p:nvSpPr>
+        <p:spPr>
+          <a:xfrm>
+            <a:off x="117695" y="4620162"/>
+            <a:ext cx="4572000" cy="369332"/>
+          </a:xfrm>
+          <a:prstGeom prst="rect">
+            <a:avLst/>
+          </a:prstGeom>
+        </p:spPr>
+        <p:txBody>
+          <a:bodyPr>
+            <a:spAutoFit/>
+          </a:bodyPr>
+          <a:lstStyle/>
+          <a:p>
+            <a:r>
+              <a:rPr lang="en-US" sz="1800" dirty="0" err="1">
+                <a:solidFill>
+                  <a:schemeClr val="tx1"/>
+                </a:solidFill>
+              </a:rPr>
+              <a:t>github.com</a:t>
+            </a:r>
+            <a:r>
+              <a:rPr lang="en-US" sz="1800" dirty="0">
+                <a:solidFill>
+                  <a:schemeClr val="tx1"/>
+                </a:solidFill>
+              </a:rPr>
+              <a:t>/</a:t>
+            </a:r>
+            <a:r>
+              <a:rPr lang="en-US" sz="1800" dirty="0" err="1">
+                <a:solidFill>
+                  <a:schemeClr val="tx1"/>
+                </a:solidFill>
+              </a:rPr>
+              <a:t>isidore</a:t>
+            </a:r>
+            <a:r>
+              <a:rPr lang="en-US" sz="1800" dirty="0">
+                <a:solidFill>
+                  <a:schemeClr val="tx1"/>
+                </a:solidFill>
+              </a:rPr>
+              <a:t>/Talks</a:t>
+            </a:r>
+          </a:p>
+        </p:txBody>
+      </p:sp>
+    </p:spTree>
+    <p:extLst>
+      <p:ext uri="{BB962C8B-B14F-4D97-AF65-F5344CB8AC3E}">
+        <p14:creationId xmlns:p14="http://schemas.microsoft.com/office/powerpoint/2010/main" val="2792857470"/>
+      </p:ext>
+    </p:extLst>
+  </p:cSld>
+  <p:clrMapOvr>
+    <a:masterClrMapping/>
+  </p:clrMapOvr>
+</p:sld>
+</file>
+
+<file path=ppt/slides/slide28.xml><?xml version="1.0" encoding="utf-8"?>
+<p:sld xmlns:a="http://schemas.openxmlformats.org/drawingml/2006/main" xmlns:r="http://schemas.openxmlformats.org/officeDocument/2006/relationships" xmlns:p="http://schemas.openxmlformats.org/presentationml/2006/main">
+  <p:cSld>
+    <p:spTree>
+      <p:nvGrpSpPr>
         <p:cNvPr id="1" name="Shape 285"/>
         <p:cNvGrpSpPr/>
         <p:nvPr/>
@@ -48379,7 +48583,7 @@
             </a:pPr>
             <a:fld id="{00000000-1234-1234-1234-123412341234}" type="slidenum">
               <a:rPr lang="en"/>
-              <a:t>27</a:t>
+              <a:t>28</a:t>
             </a:fld>
             <a:endParaRPr/>
           </a:p>

</xml_diff>